<commit_message>
fix: session-06 slide-10 checklist rendered as vertical list
Split inline checklist items into separate lines so each
checkbox item displays on its own row.
</commit_message>
<xml_diff>
--- a/sessions/session-06/slides.pptx
+++ b/sessions/session-06/slides.pptx
@@ -3492,7 +3492,76 @@
                 <a:ea typeface="Arial" pitchFamily="34" charset="-122"/>
                 <a:cs typeface="Arial" pitchFamily="34" charset="-120"/>
               </a:rPr>
-              <a:t>3.  Checklist — ☐ Photos attached  ☐ Parts identified  ☐ Assigned</a:t>
+              <a:t>3.  Checklist:</a:t>
+            </a:r>
+            <a:endParaRPr lang="en-US" sz="1800" dirty="0"/>
+          </a:p>
+          <a:p>
+            <a:pPr indent="0" marL="0">
+              <a:lnSpc>
+                <a:spcPct val="120000"/>
+              </a:lnSpc>
+              <a:spcBef>
+                <a:spcPts val="400"/>
+              </a:spcBef>
+              <a:buNone/>
+            </a:pPr>
+            <a:r>
+              <a:rPr lang="en-US" sz="1300" dirty="0">
+                <a:solidFill>
+                  <a:srgbClr val="2C2C2C"/>
+                </a:solidFill>
+                <a:latin typeface="Arial" pitchFamily="34" charset="0"/>
+                <a:ea typeface="Arial" pitchFamily="34" charset="-122"/>
+                <a:cs typeface="Arial" pitchFamily="34" charset="-120"/>
+              </a:rPr>
+              <a:t>     ☐ Photos attached</a:t>
+            </a:r>
+            <a:endParaRPr lang="en-US" sz="1800" dirty="0"/>
+          </a:p>
+          <a:p>
+            <a:pPr indent="0" marL="0">
+              <a:lnSpc>
+                <a:spcPct val="120000"/>
+              </a:lnSpc>
+              <a:spcBef>
+                <a:spcPts val="400"/>
+              </a:spcBef>
+              <a:buNone/>
+            </a:pPr>
+            <a:r>
+              <a:rPr lang="en-US" sz="1300" dirty="0">
+                <a:solidFill>
+                  <a:srgbClr val="2C2C2C"/>
+                </a:solidFill>
+                <a:latin typeface="Arial" pitchFamily="34" charset="0"/>
+                <a:ea typeface="Arial" pitchFamily="34" charset="-122"/>
+                <a:cs typeface="Arial" pitchFamily="34" charset="-120"/>
+              </a:rPr>
+              <a:t>     ☐ Parts identified</a:t>
+            </a:r>
+            <a:endParaRPr lang="en-US" sz="1800" dirty="0"/>
+          </a:p>
+          <a:p>
+            <a:pPr indent="0" marL="0">
+              <a:lnSpc>
+                <a:spcPct val="120000"/>
+              </a:lnSpc>
+              <a:spcBef>
+                <a:spcPts val="400"/>
+              </a:spcBef>
+              <a:buNone/>
+            </a:pPr>
+            <a:r>
+              <a:rPr lang="en-US" sz="1300" dirty="0">
+                <a:solidFill>
+                  <a:srgbClr val="2C2C2C"/>
+                </a:solidFill>
+                <a:latin typeface="Arial" pitchFamily="34" charset="0"/>
+                <a:ea typeface="Arial" pitchFamily="34" charset="-122"/>
+                <a:cs typeface="Arial" pitchFamily="34" charset="-120"/>
+              </a:rPr>
+              <a:t>     ☐ Assigned</a:t>
             </a:r>
             <a:endParaRPr lang="en-US" sz="1800" dirty="0"/>
           </a:p>

</xml_diff>